<commit_message>
Updating Student Talks Presentation
</commit_message>
<xml_diff>
--- a/Student Talks Presentation.pptx
+++ b/Student Talks Presentation.pptx
@@ -15,6 +15,7 @@
     <p:sldId id="263" r:id="rId9"/>
     <p:sldId id="264" r:id="rId10"/>
     <p:sldId id="265" r:id="rId11"/>
+    <p:sldId id="266" r:id="rId12"/>
   </p:sldIdLst>
   <p:sldSz cx="12192000" cy="6858000"/>
   <p:notesSz cx="6858000" cy="9144000"/>
@@ -113,6 +114,11 @@
       </a:defRPr>
     </a:lvl9pPr>
   </p:defaultTextStyle>
+  <p:extLst>
+    <p:ext uri="{EFAFB233-063F-42B5-8137-9DF3F51BA10A}">
+      <p15:sldGuideLst xmlns:p15="http://schemas.microsoft.com/office/powerpoint/2012/main"/>
+    </p:ext>
+  </p:extLst>
 </p:presentation>
 </file>
 
@@ -3145,6 +3151,134 @@
 </p:sld>
 </file>
 
+<file path=ppt/slides/slide11.xml><?xml version="1.0" encoding="utf-8"?>
+<p:sld xmlns:a="http://schemas.openxmlformats.org/drawingml/2006/main" xmlns:r="http://schemas.openxmlformats.org/officeDocument/2006/relationships" xmlns:p="http://schemas.openxmlformats.org/presentationml/2006/main">
+  <p:cSld>
+    <p:spTree>
+      <p:nvGrpSpPr>
+        <p:cNvPr id="1" name=""/>
+        <p:cNvGrpSpPr/>
+        <p:nvPr/>
+      </p:nvGrpSpPr>
+      <p:grpSpPr>
+        <a:xfrm>
+          <a:off x="0" y="0"/>
+          <a:ext cx="0" cy="0"/>
+          <a:chOff x="0" y="0"/>
+          <a:chExt cx="0" cy="0"/>
+        </a:xfrm>
+      </p:grpSpPr>
+      <p:sp>
+        <p:nvSpPr>
+          <p:cNvPr id="2" name="Title 1"/>
+          <p:cNvSpPr>
+            <a:spLocks noGrp="1"/>
+          </p:cNvSpPr>
+          <p:nvPr>
+            <p:ph type="title"/>
+          </p:nvPr>
+        </p:nvSpPr>
+        <p:spPr/>
+        <p:txBody>
+          <a:bodyPr/>
+          <a:lstStyle/>
+          <a:p>
+            <a:r>
+              <a:rPr lang="en-US" b="1" dirty="0" smtClean="0"/>
+              <a:t>References</a:t>
+            </a:r>
+            <a:endParaRPr lang="en-US" b="1" dirty="0"/>
+          </a:p>
+        </p:txBody>
+      </p:sp>
+      <p:sp>
+        <p:nvSpPr>
+          <p:cNvPr id="3" name="Content Placeholder 2"/>
+          <p:cNvSpPr>
+            <a:spLocks noGrp="1"/>
+          </p:cNvSpPr>
+          <p:nvPr>
+            <p:ph idx="1"/>
+          </p:nvPr>
+        </p:nvSpPr>
+        <p:spPr/>
+        <p:txBody>
+          <a:bodyPr/>
+          <a:lstStyle/>
+          <a:p>
+            <a:r>
+              <a:rPr lang="en-US" dirty="0" err="1"/>
+              <a:t>Wilbanks</a:t>
+            </a:r>
+            <a:r>
+              <a:rPr lang="en-US" dirty="0"/>
+              <a:t>, E. G., &amp; </a:t>
+            </a:r>
+            <a:r>
+              <a:rPr lang="en-US" dirty="0" err="1"/>
+              <a:t>Facciotti</a:t>
+            </a:r>
+            <a:r>
+              <a:rPr lang="en-US" dirty="0"/>
+              <a:t>, M. T. (2010). Evaluation of algorithm performance in </a:t>
+            </a:r>
+            <a:r>
+              <a:rPr lang="en-US" dirty="0" err="1"/>
+              <a:t>ChIP-seq</a:t>
+            </a:r>
+            <a:r>
+              <a:rPr lang="en-US" dirty="0"/>
+              <a:t> peak detection. </a:t>
+            </a:r>
+            <a:r>
+              <a:rPr lang="en-US" i="1" dirty="0" err="1"/>
+              <a:t>PloS</a:t>
+            </a:r>
+            <a:r>
+              <a:rPr lang="en-US" i="1" dirty="0"/>
+              <a:t> One</a:t>
+            </a:r>
+            <a:r>
+              <a:rPr lang="en-US" dirty="0"/>
+              <a:t>, </a:t>
+            </a:r>
+            <a:r>
+              <a:rPr lang="en-US" i="1" dirty="0"/>
+              <a:t>5</a:t>
+            </a:r>
+            <a:r>
+              <a:rPr lang="en-US" dirty="0"/>
+              <a:t>(7), e11471. doi:10.1371/journal.pone.0011471</a:t>
+            </a:r>
+          </a:p>
+          <a:p>
+            <a:pPr marL="0" indent="0">
+              <a:buNone/>
+            </a:pPr>
+            <a:endParaRPr lang="en-US" dirty="0"/>
+          </a:p>
+        </p:txBody>
+      </p:sp>
+    </p:spTree>
+    <p:extLst>
+      <p:ext uri="{BB962C8B-B14F-4D97-AF65-F5344CB8AC3E}">
+        <p14:creationId xmlns:p14="http://schemas.microsoft.com/office/powerpoint/2010/main" val="1858079517"/>
+      </p:ext>
+    </p:extLst>
+  </p:cSld>
+  <p:clrMapOvr>
+    <a:masterClrMapping/>
+  </p:clrMapOvr>
+  <p:timing>
+    <p:tnLst>
+      <p:par>
+        <p:cTn id="1" dur="indefinite" restart="never" nodeType="tmRoot"/>
+      </p:par>
+    </p:tnLst>
+  </p:timing>
+</p:sld>
+</file>
+
 <file path=ppt/slides/slide2.xml><?xml version="1.0" encoding="utf-8"?>
 <p:sld xmlns:a="http://schemas.openxmlformats.org/drawingml/2006/main" xmlns:r="http://schemas.openxmlformats.org/officeDocument/2006/relationships" xmlns:p="http://schemas.openxmlformats.org/presentationml/2006/main">
   <p:cSld>
@@ -3178,14 +3312,14 @@
           <a:lstStyle/>
           <a:p>
             <a:r>
-              <a:rPr lang="en-US" dirty="0" smtClean="0"/>
+              <a:rPr lang="en-US" b="1" dirty="0" smtClean="0"/>
               <a:t>Overview of </a:t>
             </a:r>
             <a:r>
-              <a:rPr lang="en-US" dirty="0" err="1" smtClean="0"/>
+              <a:rPr lang="en-US" b="1" dirty="0" err="1" smtClean="0"/>
               <a:t>ChIP-seq</a:t>
             </a:r>
-            <a:endParaRPr lang="en-US" dirty="0"/>
+            <a:endParaRPr lang="en-US" b="1" dirty="0"/>
           </a:p>
         </p:txBody>
       </p:sp>
@@ -3315,10 +3449,10 @@
           <a:lstStyle/>
           <a:p>
             <a:r>
-              <a:rPr lang="en-US" dirty="0" smtClean="0"/>
+              <a:rPr lang="en-US" b="1" dirty="0" smtClean="0"/>
               <a:t>A genome wide histogram</a:t>
             </a:r>
-            <a:endParaRPr lang="en-US" dirty="0"/>
+            <a:endParaRPr lang="en-US" b="1" dirty="0"/>
           </a:p>
         </p:txBody>
       </p:sp>
@@ -3431,26 +3565,14 @@
           <a:lstStyle/>
           <a:p>
             <a:r>
-              <a:rPr lang="en-US" dirty="0" err="1" smtClean="0"/>
-              <a:t>ChIP-</a:t>
-            </a:r>
-            <a:r>
-              <a:rPr lang="en-US" dirty="0" err="1" smtClean="0"/>
-              <a:t>s</a:t>
-            </a:r>
-            <a:r>
-              <a:rPr lang="en-US" dirty="0" err="1" smtClean="0"/>
-              <a:t>eq</a:t>
-            </a:r>
-            <a:r>
-              <a:rPr lang="en-US" dirty="0" smtClean="0"/>
-              <a:t> </a:t>
-            </a:r>
-            <a:r>
-              <a:rPr lang="en-US" dirty="0" smtClean="0"/>
-              <a:t>calling programs</a:t>
-            </a:r>
-            <a:endParaRPr lang="en-US" dirty="0"/>
+              <a:rPr lang="en-US" b="1" dirty="0" err="1" smtClean="0"/>
+              <a:t>ChIP-seq</a:t>
+            </a:r>
+            <a:r>
+              <a:rPr lang="en-US" b="1" dirty="0" smtClean="0"/>
+              <a:t> calling programs</a:t>
+            </a:r>
+            <a:endParaRPr lang="en-US" b="1" dirty="0"/>
           </a:p>
         </p:txBody>
       </p:sp>
@@ -3473,11 +3595,7 @@
           <a:p>
             <a:r>
               <a:rPr lang="en-US" dirty="0" smtClean="0"/>
-              <a:t>SISSRS: </a:t>
-            </a:r>
-            <a:r>
-              <a:rPr lang="en-US" dirty="0" smtClean="0"/>
-              <a:t>only get start</a:t>
+              <a:t>SISSRS: only get start</a:t>
             </a:r>
             <a:r>
               <a:rPr lang="en-US" dirty="0"/>
@@ -3631,7 +3749,7 @@
         </p:nvGraphicFramePr>
         <p:xfrm>
           <a:off x="2651887" y="1690688"/>
-          <a:ext cx="5937250" cy="771716"/>
+          <a:ext cx="5937250" cy="799085"/>
         </p:xfrm>
         <a:graphic>
           <a:graphicData uri="http://schemas.openxmlformats.org/drawingml/2006/table">
@@ -3960,7 +4078,7 @@
         </p:nvGraphicFramePr>
         <p:xfrm>
           <a:off x="2642743" y="3254279"/>
-          <a:ext cx="5937250" cy="771716"/>
+          <a:ext cx="5937250" cy="799085"/>
         </p:xfrm>
         <a:graphic>
           <a:graphicData uri="http://schemas.openxmlformats.org/drawingml/2006/table">
@@ -4289,7 +4407,7 @@
         </p:nvGraphicFramePr>
         <p:xfrm>
           <a:off x="2624455" y="4900199"/>
-          <a:ext cx="5937250" cy="771716"/>
+          <a:ext cx="5937250" cy="799085"/>
         </p:xfrm>
         <a:graphic>
           <a:graphicData uri="http://schemas.openxmlformats.org/drawingml/2006/table">
@@ -4683,7 +4801,7 @@
         </p:nvGraphicFramePr>
         <p:xfrm>
           <a:off x="2862199" y="2804126"/>
-          <a:ext cx="5937250" cy="2034350"/>
+          <a:ext cx="5937250" cy="2120015"/>
         </p:xfrm>
         <a:graphic>
           <a:graphicData uri="http://schemas.openxmlformats.org/drawingml/2006/table">
@@ -7282,6 +7400,52 @@
           <a:lstStyle/>
           <a:p>
             <a:endParaRPr lang="en-US"/>
+          </a:p>
+        </p:txBody>
+      </p:sp>
+      <p:sp>
+        <p:nvSpPr>
+          <p:cNvPr id="6" name="TextBox 5"/>
+          <p:cNvSpPr txBox="1"/>
+          <p:nvPr/>
+        </p:nvSpPr>
+        <p:spPr>
+          <a:xfrm>
+            <a:off x="4870580" y="1742503"/>
+            <a:ext cx="1791477" cy="1200329"/>
+          </a:xfrm>
+          <a:prstGeom prst="rect">
+            <a:avLst/>
+          </a:prstGeom>
+          <a:noFill/>
+        </p:spPr>
+        <p:txBody>
+          <a:bodyPr wrap="square" rtlCol="0">
+            <a:spAutoFit/>
+          </a:bodyPr>
+          <a:lstStyle/>
+          <a:p>
+            <a:r>
+              <a:rPr lang="en-US" dirty="0" smtClean="0"/>
+              <a:t>Top Two figures are from </a:t>
+            </a:r>
+            <a:r>
+              <a:rPr lang="en-US" dirty="0" err="1" smtClean="0"/>
+              <a:t>Wilbanks</a:t>
+            </a:r>
+            <a:r>
+              <a:rPr lang="en-US" dirty="0" smtClean="0"/>
+              <a:t> et. al (2010) </a:t>
+            </a:r>
+            <a:r>
+              <a:rPr lang="en-US" dirty="0" err="1" smtClean="0"/>
+              <a:t>Plos</a:t>
+            </a:r>
+            <a:r>
+              <a:rPr lang="en-US" dirty="0" smtClean="0"/>
+              <a:t> One.</a:t>
+            </a:r>
+            <a:endParaRPr lang="en-US" dirty="0"/>
           </a:p>
         </p:txBody>
       </p:sp>

</xml_diff>